<commit_message>
Finished Presentation. Added Dummy files to sln
</commit_message>
<xml_diff>
--- a/Präsentation/2016.07.28 - Zwischenstand/Suchen in statischen Texten.pptx
+++ b/Präsentation/2016.07.28 - Zwischenstand/Suchen in statischen Texten.pptx
@@ -7063,14 +7063,84 @@
             <p:ph idx="1"/>
           </p:nvPr>
         </p:nvSpPr>
-        <p:spPr/>
-        <p:txBody>
-          <a:bodyPr/>
+        <p:spPr>
+          <a:xfrm>
+            <a:off x="2572279" y="1845733"/>
+            <a:ext cx="8930744" cy="4250267"/>
+          </a:xfrm>
+        </p:spPr>
+        <p:txBody>
+          <a:bodyPr>
+            <a:normAutofit/>
+          </a:bodyPr>
           <a:lstStyle/>
           <a:p>
             <a:r>
               <a:rPr lang="de-DE" dirty="0"/>
-              <a:t>AAAABBELE</a:t>
+              <a:t>Travis-CI kann das Projekt per </a:t>
+            </a:r>
+            <a:r>
+              <a:rPr lang="de-DE" dirty="0" err="1"/>
+              <a:t>Cmake</a:t>
+            </a:r>
+            <a:r>
+              <a:rPr lang="de-DE" dirty="0"/>
+              <a:t> </a:t>
+            </a:r>
+            <a:r>
+              <a:rPr lang="de-DE" dirty="0" err="1"/>
+              <a:t>compilieren</a:t>
+            </a:r>
+            <a:r>
+              <a:rPr lang="de-DE" dirty="0"/>
+              <a:t> und starten</a:t>
+            </a:r>
+          </a:p>
+          <a:p>
+            <a:r>
+              <a:rPr lang="de-DE" dirty="0"/>
+              <a:t>Erste Version des Suffix-Baumes ist fertig</a:t>
+            </a:r>
+          </a:p>
+          <a:p>
+            <a:r>
+              <a:rPr lang="de-DE" dirty="0"/>
+              <a:t>Momentan: Einlesen des Textes, sowie Umwandlung in gewünschte Form</a:t>
+            </a:r>
+          </a:p>
+          <a:p>
+            <a:r>
+              <a:rPr lang="de-DE" dirty="0"/>
+              <a:t>Demnächst: </a:t>
+            </a:r>
+          </a:p>
+          <a:p>
+            <a:pPr lvl="1"/>
+            <a:r>
+              <a:rPr lang="de-DE" dirty="0"/>
+              <a:t>Steuerung per </a:t>
+            </a:r>
+            <a:r>
+              <a:rPr lang="de-DE" dirty="0" err="1"/>
+              <a:t>cmd</a:t>
+            </a:r>
+            <a:r>
+              <a:rPr lang="de-DE" dirty="0"/>
+              <a:t>/GUI</a:t>
+            </a:r>
+          </a:p>
+          <a:p>
+            <a:pPr lvl="1"/>
+            <a:r>
+              <a:rPr lang="de-DE" dirty="0"/>
+              <a:t>Andere Suchvarianten</a:t>
+            </a:r>
+          </a:p>
+          <a:p>
+            <a:pPr lvl="1"/>
+            <a:r>
+              <a:rPr lang="de-DE" dirty="0"/>
+              <a:t>Unit Tests</a:t>
             </a:r>
           </a:p>
         </p:txBody>

</xml_diff>